<commit_message>
Day 19 content updated
</commit_message>
<xml_diff>
--- a/Day19/DockerAndKubernetes_Training-Day19.pptx
+++ b/Day19/DockerAndKubernetes_Training-Day19.pptx
@@ -13800,7 +13800,7 @@
         </p:spPr>
         <p:txBody>
           <a:bodyPr vert="horz" lIns="91440" tIns="45720" rIns="91440" bIns="45720" rtlCol="0">
-            <a:normAutofit/>
+            <a:normAutofit fontScale="92500" lnSpcReduction="10000"/>
           </a:bodyPr>
           <a:lstStyle>
             <a:lvl1pPr marL="342900" indent="-342900" algn="l" defTabSz="457200" rtl="0" eaLnBrk="1" latinLnBrk="0" hangingPunct="1">
@@ -14032,63 +14032,81 @@
           <a:p>
             <a:r>
               <a:rPr lang="en-US" dirty="0"/>
-              <a:t>Any query from previous session</a:t>
+              <a:t>Recap/Any query from previous session</a:t>
             </a:r>
           </a:p>
           <a:p>
             <a:r>
               <a:rPr lang="en-US" dirty="0"/>
-              <a:t>Docker Swarm – Concept understanding</a:t>
+              <a:t>Docker Swarm – Deep Dive</a:t>
             </a:r>
           </a:p>
           <a:p>
             <a:pPr lvl="1"/>
             <a:r>
               <a:rPr lang="en-US" dirty="0"/>
-              <a:t>Swarm Mode Overview</a:t>
+              <a:t>Swarm Mode Concepts</a:t>
             </a:r>
           </a:p>
           <a:p>
             <a:pPr lvl="1"/>
             <a:r>
               <a:rPr lang="en-US" dirty="0"/>
-              <a:t>Host only network setup</a:t>
+              <a:t>Swarm Task State</a:t>
             </a:r>
           </a:p>
           <a:p>
             <a:pPr lvl="1"/>
             <a:r>
               <a:rPr lang="en-US" dirty="0"/>
-              <a:t>Swarm Mode Installation</a:t>
+              <a:t>Deploy Service</a:t>
             </a:r>
           </a:p>
           <a:p>
             <a:pPr lvl="1"/>
             <a:r>
               <a:rPr lang="en-US" dirty="0"/>
-              <a:t>Swarm – operations at node level</a:t>
+              <a:t>Perform Failovers</a:t>
             </a:r>
           </a:p>
           <a:p>
             <a:pPr lvl="1"/>
             <a:r>
               <a:rPr lang="en-US" dirty="0"/>
-              <a:t>Manage nodes</a:t>
+              <a:t>Manager/Worker Node – Operations</a:t>
             </a:r>
           </a:p>
           <a:p>
             <a:pPr lvl="1"/>
             <a:r>
               <a:rPr lang="en-US" dirty="0"/>
-              <a:t>Availability/Drain</a:t>
+              <a:t>Manage Configuration</a:t>
             </a:r>
           </a:p>
           <a:p>
             <a:pPr lvl="1"/>
             <a:r>
               <a:rPr lang="en-US" dirty="0"/>
-              <a:t>Manager/Worker Node - Operations</a:t>
+              <a:t>Manage Sensitive data – Secrets</a:t>
             </a:r>
+          </a:p>
+          <a:p>
+            <a:pPr lvl="1"/>
+            <a:r>
+              <a:rPr lang="en-US" dirty="0"/>
+              <a:t>Manage Swarm Deploy</a:t>
+            </a:r>
+          </a:p>
+          <a:p>
+            <a:pPr lvl="1"/>
+            <a:r>
+              <a:rPr lang="en-US" dirty="0"/>
+              <a:t>Swarm Admin state</a:t>
+            </a:r>
+          </a:p>
+          <a:p>
+            <a:pPr lvl="1"/>
+            <a:endParaRPr lang="en-US" dirty="0"/>
           </a:p>
           <a:p>
             <a:pPr marL="914400" lvl="2" indent="0">
@@ -14217,7 +14235,7 @@
         </p:spPr>
         <p:txBody>
           <a:bodyPr>
-            <a:normAutofit lnSpcReduction="10000"/>
+            <a:normAutofit fontScale="85000" lnSpcReduction="10000"/>
           </a:bodyPr>
           <a:lstStyle/>
           <a:p>
@@ -14249,6 +14267,12 @@
           <a:p>
             <a:r>
               <a:rPr lang="en-US" dirty="0"/>
+              <a:t>Docker Swarm Network - https://docs.docker.com/engine/swarm/networking/</a:t>
+            </a:r>
+          </a:p>
+          <a:p>
+            <a:r>
+              <a:rPr lang="en-US" dirty="0"/>
               <a:t>Store Configuration - </a:t>
             </a:r>
             <a:r>
@@ -14301,21 +14325,21 @@
           <a:p>
             <a:r>
               <a:rPr lang="en-US" dirty="0"/>
-              <a:t>Raft Consensus – </a:t>
+              <a:t>Docker Swarm Administration - </a:t>
             </a:r>
-          </a:p>
-          <a:p>
-            <a:pPr lvl="1">
-              <a:buFont typeface="Wingdings" panose="05000000000000000000" pitchFamily="2" charset="2"/>
-              <a:buChar char="Ø"/>
-            </a:pPr>
             <a:r>
               <a:rPr lang="en-US" dirty="0">
                 <a:hlinkClick r:id="rId8"/>
               </a:rPr>
-              <a:t>https://docs.docker.com/engine/swarm/raft/</a:t>
+              <a:t>https://docs.docker.com/engine/swarm/admin_guide/</a:t>
             </a:r>
             <a:endParaRPr lang="en-US" dirty="0"/>
+          </a:p>
+          <a:p>
+            <a:r>
+              <a:rPr lang="en-US" dirty="0"/>
+              <a:t>Raft Consensus – </a:t>
+            </a:r>
           </a:p>
           <a:p>
             <a:pPr lvl="1">
@@ -14325,6 +14349,19 @@
             <a:r>
               <a:rPr lang="en-US" dirty="0">
                 <a:hlinkClick r:id="rId9"/>
+              </a:rPr>
+              <a:t>https://docs.docker.com/engine/swarm/raft/</a:t>
+            </a:r>
+            <a:endParaRPr lang="en-US" dirty="0"/>
+          </a:p>
+          <a:p>
+            <a:pPr lvl="1">
+              <a:buFont typeface="Wingdings" panose="05000000000000000000" pitchFamily="2" charset="2"/>
+              <a:buChar char="Ø"/>
+            </a:pPr>
+            <a:r>
+              <a:rPr lang="en-US" dirty="0">
+                <a:hlinkClick r:id="rId10"/>
               </a:rPr>
               <a:t>http://thesecretlivesofdata.com/raft/</a:t>
             </a:r>

</xml_diff>